<commit_message>
First Commit message for meetup  Open source programming knowledgebase
</commit_message>
<xml_diff>
--- a/GitHub/Github Tutorial for Beginners.pptx
+++ b/GitHub/Github Tutorial for Beginners.pptx
@@ -5389,7 +5389,7 @@
         <p:spPr>
           <a:xfrm>
             <a:off x="838199" y="1300163"/>
-            <a:ext cx="10187763" cy="1754326"/>
+            <a:ext cx="10187763" cy="3693319"/>
           </a:xfrm>
           <a:prstGeom prst="rect">
             <a:avLst/>
@@ -5465,7 +5465,7 @@
                 </a:solidFill>
                 <a:latin typeface="Swiss 721 SWA"/>
               </a:rPr>
-              <a:t>Command : Git </a:t>
+              <a:t>Command : git </a:t>
             </a:r>
             <a:r>
               <a:rPr lang="en-US" dirty="0" err="1">
@@ -5482,6 +5482,180 @@
               </a:solidFill>
               <a:latin typeface="Swiss 721 SWA"/>
             </a:endParaRPr>
+          </a:p>
+          <a:p>
+            <a:pPr marL="342900" indent="-342900">
+              <a:buFont typeface="+mj-lt"/>
+              <a:buAutoNum type="arabicPeriod"/>
+            </a:pPr>
+            <a:r>
+              <a:rPr lang="en-US" dirty="0">
+                <a:solidFill>
+                  <a:srgbClr val="444444"/>
+                </a:solidFill>
+                <a:latin typeface="Swiss 721 SWA"/>
+              </a:rPr>
+              <a:t>Add Local repository</a:t>
+            </a:r>
+          </a:p>
+          <a:p>
+            <a:pPr marL="800100" lvl="1" indent="-342900">
+              <a:buFont typeface="+mj-lt"/>
+              <a:buAutoNum type="arabicPeriod"/>
+            </a:pPr>
+            <a:r>
+              <a:rPr lang="en-US" dirty="0">
+                <a:solidFill>
+                  <a:srgbClr val="444444"/>
+                </a:solidFill>
+                <a:latin typeface="Swiss 721 SWA"/>
+              </a:rPr>
+              <a:t>Command : git add .</a:t>
+            </a:r>
+          </a:p>
+          <a:p>
+            <a:pPr marL="342900" indent="-342900">
+              <a:buFont typeface="+mj-lt"/>
+              <a:buAutoNum type="arabicPeriod"/>
+            </a:pPr>
+            <a:r>
+              <a:rPr lang="en-US" dirty="0">
+                <a:solidFill>
+                  <a:srgbClr val="444444"/>
+                </a:solidFill>
+                <a:latin typeface="Swiss 721 SWA"/>
+              </a:rPr>
+              <a:t>Add remote Repository URL, Below command enable to push your local repository changes. </a:t>
+            </a:r>
+          </a:p>
+          <a:p>
+            <a:pPr marL="800100" lvl="1" indent="-342900">
+              <a:buFont typeface="+mj-lt"/>
+              <a:buAutoNum type="arabicPeriod"/>
+            </a:pPr>
+            <a:r>
+              <a:rPr lang="en-US" dirty="0">
+                <a:solidFill>
+                  <a:srgbClr val="444444"/>
+                </a:solidFill>
+                <a:latin typeface="Swiss 721 SWA"/>
+              </a:rPr>
+              <a:t>Command : git remote add origin https://</a:t>
+            </a:r>
+            <a:r>
+              <a:rPr lang="en-US" dirty="0" err="1">
+                <a:solidFill>
+                  <a:srgbClr val="444444"/>
+                </a:solidFill>
+                <a:latin typeface="Swiss 721 SWA"/>
+              </a:rPr>
+              <a:t>github.com</a:t>
+            </a:r>
+            <a:r>
+              <a:rPr lang="en-US" dirty="0">
+                <a:solidFill>
+                  <a:srgbClr val="444444"/>
+                </a:solidFill>
+                <a:latin typeface="Swiss 721 SWA"/>
+              </a:rPr>
+              <a:t>/</a:t>
+            </a:r>
+            <a:r>
+              <a:rPr lang="en-US" dirty="0" err="1">
+                <a:solidFill>
+                  <a:srgbClr val="444444"/>
+                </a:solidFill>
+                <a:latin typeface="Swiss 721 SWA"/>
+              </a:rPr>
+              <a:t>mopenn</a:t>
+            </a:r>
+            <a:r>
+              <a:rPr lang="en-US" dirty="0">
+                <a:solidFill>
+                  <a:srgbClr val="444444"/>
+                </a:solidFill>
+                <a:latin typeface="Swiss 721 SWA"/>
+              </a:rPr>
+              <a:t>/</a:t>
+            </a:r>
+            <a:r>
+              <a:rPr lang="en-US" dirty="0" err="1">
+                <a:solidFill>
+                  <a:srgbClr val="444444"/>
+                </a:solidFill>
+                <a:latin typeface="Swiss 721 SWA"/>
+              </a:rPr>
+              <a:t>opensource.git</a:t>
+            </a:r>
+            <a:endParaRPr lang="en-US" dirty="0">
+              <a:solidFill>
+                <a:srgbClr val="444444"/>
+              </a:solidFill>
+              <a:latin typeface="Swiss 721 SWA"/>
+            </a:endParaRPr>
+          </a:p>
+          <a:p>
+            <a:pPr marL="342900" indent="-342900">
+              <a:buFont typeface="+mj-lt"/>
+              <a:buAutoNum type="arabicPeriod"/>
+            </a:pPr>
+            <a:r>
+              <a:rPr lang="en-US" dirty="0">
+                <a:solidFill>
+                  <a:srgbClr val="444444"/>
+                </a:solidFill>
+                <a:latin typeface="Swiss 721 SWA"/>
+              </a:rPr>
+              <a:t>Push Local </a:t>
+            </a:r>
+            <a:r>
+              <a:rPr lang="en-US" dirty="0" err="1">
+                <a:solidFill>
+                  <a:srgbClr val="444444"/>
+                </a:solidFill>
+                <a:latin typeface="Swiss 721 SWA"/>
+              </a:rPr>
+              <a:t>Respository</a:t>
+            </a:r>
+            <a:r>
+              <a:rPr lang="en-US" dirty="0">
+                <a:solidFill>
+                  <a:srgbClr val="444444"/>
+                </a:solidFill>
+                <a:latin typeface="Swiss 721 SWA"/>
+              </a:rPr>
+              <a:t> to GitHub</a:t>
+            </a:r>
+          </a:p>
+          <a:p>
+            <a:pPr marL="800100" lvl="1" indent="-342900">
+              <a:buFont typeface="+mj-lt"/>
+              <a:buAutoNum type="arabicPeriod"/>
+            </a:pPr>
+            <a:r>
+              <a:rPr lang="en-US" dirty="0">
+                <a:solidFill>
+                  <a:srgbClr val="444444"/>
+                </a:solidFill>
+                <a:latin typeface="Swiss 721 SWA"/>
+              </a:rPr>
+              <a:t>Command : git push origin documentation</a:t>
+            </a:r>
+          </a:p>
+          <a:p>
+            <a:pPr marL="342900" indent="-342900">
+              <a:buFont typeface="+mj-lt"/>
+              <a:buAutoNum type="arabicPeriod"/>
+            </a:pPr>
+            <a:r>
+              <a:rPr lang="en-US" dirty="0">
+                <a:solidFill>
+                  <a:srgbClr val="444444"/>
+                </a:solidFill>
+                <a:latin typeface="Swiss 721 SWA"/>
+              </a:rPr>
+              <a:t>  </a:t>
+            </a:r>
           </a:p>
           <a:p>
             <a:pPr marL="342900" indent="-342900">

</xml_diff>

<commit_message>
made changes to the github presentation
</commit_message>
<xml_diff>
--- a/GitHub/Github Tutorial for Beginners.pptx
+++ b/GitHub/Github Tutorial for Beginners.pptx
@@ -202,7 +202,7 @@
           <a:p>
             <a:fld id="{69349387-990C-47ED-9AD6-AB48EBEDE7E2}" type="datetimeFigureOut">
               <a:rPr lang="en-US" smtClean="0"/>
-              <a:t>7/25/20</a:t>
+              <a:t>7/26/20</a:t>
             </a:fld>
             <a:endParaRPr lang="en-US"/>
           </a:p>
@@ -784,7 +784,7 @@
           <a:p>
             <a:fld id="{D293FDA7-2A39-4CAD-8199-039D133783F5}" type="datetimeFigureOut">
               <a:rPr lang="en-US" smtClean="0"/>
-              <a:t>7/25/20</a:t>
+              <a:t>7/26/20</a:t>
             </a:fld>
             <a:endParaRPr lang="en-US"/>
           </a:p>
@@ -982,7 +982,7 @@
           <a:p>
             <a:fld id="{D293FDA7-2A39-4CAD-8199-039D133783F5}" type="datetimeFigureOut">
               <a:rPr lang="en-US" smtClean="0"/>
-              <a:t>7/25/20</a:t>
+              <a:t>7/26/20</a:t>
             </a:fld>
             <a:endParaRPr lang="en-US"/>
           </a:p>
@@ -1190,7 +1190,7 @@
           <a:p>
             <a:fld id="{D293FDA7-2A39-4CAD-8199-039D133783F5}" type="datetimeFigureOut">
               <a:rPr lang="en-US" smtClean="0"/>
-              <a:t>7/25/20</a:t>
+              <a:t>7/26/20</a:t>
             </a:fld>
             <a:endParaRPr lang="en-US"/>
           </a:p>
@@ -1388,7 +1388,7 @@
           <a:p>
             <a:fld id="{D293FDA7-2A39-4CAD-8199-039D133783F5}" type="datetimeFigureOut">
               <a:rPr lang="en-US" smtClean="0"/>
-              <a:t>7/25/20</a:t>
+              <a:t>7/26/20</a:t>
             </a:fld>
             <a:endParaRPr lang="en-US"/>
           </a:p>
@@ -1663,7 +1663,7 @@
           <a:p>
             <a:fld id="{D293FDA7-2A39-4CAD-8199-039D133783F5}" type="datetimeFigureOut">
               <a:rPr lang="en-US" smtClean="0"/>
-              <a:t>7/25/20</a:t>
+              <a:t>7/26/20</a:t>
             </a:fld>
             <a:endParaRPr lang="en-US"/>
           </a:p>
@@ -1928,7 +1928,7 @@
           <a:p>
             <a:fld id="{D293FDA7-2A39-4CAD-8199-039D133783F5}" type="datetimeFigureOut">
               <a:rPr lang="en-US" smtClean="0"/>
-              <a:t>7/25/20</a:t>
+              <a:t>7/26/20</a:t>
             </a:fld>
             <a:endParaRPr lang="en-US"/>
           </a:p>
@@ -2340,7 +2340,7 @@
           <a:p>
             <a:fld id="{D293FDA7-2A39-4CAD-8199-039D133783F5}" type="datetimeFigureOut">
               <a:rPr lang="en-US" smtClean="0"/>
-              <a:t>7/25/20</a:t>
+              <a:t>7/26/20</a:t>
             </a:fld>
             <a:endParaRPr lang="en-US"/>
           </a:p>
@@ -2481,7 +2481,7 @@
           <a:p>
             <a:fld id="{D293FDA7-2A39-4CAD-8199-039D133783F5}" type="datetimeFigureOut">
               <a:rPr lang="en-US" smtClean="0"/>
-              <a:t>7/25/20</a:t>
+              <a:t>7/26/20</a:t>
             </a:fld>
             <a:endParaRPr lang="en-US"/>
           </a:p>
@@ -2594,7 +2594,7 @@
           <a:p>
             <a:fld id="{D293FDA7-2A39-4CAD-8199-039D133783F5}" type="datetimeFigureOut">
               <a:rPr lang="en-US" smtClean="0"/>
-              <a:t>7/25/20</a:t>
+              <a:t>7/26/20</a:t>
             </a:fld>
             <a:endParaRPr lang="en-US"/>
           </a:p>
@@ -2905,7 +2905,7 @@
           <a:p>
             <a:fld id="{D293FDA7-2A39-4CAD-8199-039D133783F5}" type="datetimeFigureOut">
               <a:rPr lang="en-US" smtClean="0"/>
-              <a:t>7/25/20</a:t>
+              <a:t>7/26/20</a:t>
             </a:fld>
             <a:endParaRPr lang="en-US"/>
           </a:p>
@@ -3193,7 +3193,7 @@
           <a:p>
             <a:fld id="{D293FDA7-2A39-4CAD-8199-039D133783F5}" type="datetimeFigureOut">
               <a:rPr lang="en-US" smtClean="0"/>
-              <a:t>7/25/20</a:t>
+              <a:t>7/26/20</a:t>
             </a:fld>
             <a:endParaRPr lang="en-US"/>
           </a:p>
@@ -3434,7 +3434,7 @@
           <a:p>
             <a:fld id="{D293FDA7-2A39-4CAD-8199-039D133783F5}" type="datetimeFigureOut">
               <a:rPr lang="en-US" smtClean="0"/>
-              <a:t>7/25/20</a:t>
+              <a:t>7/26/20</a:t>
             </a:fld>
             <a:endParaRPr lang="en-US"/>
           </a:p>
@@ -5389,7 +5389,7 @@
         <p:spPr>
           <a:xfrm>
             <a:off x="838199" y="1300163"/>
-            <a:ext cx="10187763" cy="3693319"/>
+            <a:ext cx="10187763" cy="4247317"/>
           </a:xfrm>
           <a:prstGeom prst="rect">
             <a:avLst/>
@@ -5419,7 +5419,7 @@
           <a:p>
             <a:pPr marL="800100" lvl="1" indent="-342900">
               <a:buFont typeface="+mj-lt"/>
-              <a:buAutoNum type="arabicPeriod"/>
+              <a:buAutoNum type="alphaLcParenR"/>
             </a:pPr>
             <a:r>
               <a:rPr lang="en-US" dirty="0">
@@ -5456,7 +5456,7 @@
           <a:p>
             <a:pPr marL="800100" lvl="1" indent="-342900">
               <a:buFont typeface="+mj-lt"/>
-              <a:buAutoNum type="arabicPeriod"/>
+              <a:buAutoNum type="alphaLcParenR"/>
             </a:pPr>
             <a:r>
               <a:rPr lang="en-US" dirty="0">
@@ -5501,7 +5501,7 @@
           <a:p>
             <a:pPr marL="800100" lvl="1" indent="-342900">
               <a:buFont typeface="+mj-lt"/>
-              <a:buAutoNum type="arabicPeriod"/>
+              <a:buAutoNum type="alphaLcParenR"/>
             </a:pPr>
             <a:r>
               <a:rPr lang="en-US" dirty="0">
@@ -5531,7 +5531,7 @@
           <a:p>
             <a:pPr marL="800100" lvl="1" indent="-342900">
               <a:buFont typeface="+mj-lt"/>
-              <a:buAutoNum type="arabicPeriod"/>
+              <a:buAutoNum type="alphaLcParenR"/>
             </a:pPr>
             <a:r>
               <a:rPr lang="en-US" dirty="0">
@@ -5606,7 +5606,7 @@
                 </a:solidFill>
                 <a:latin typeface="Swiss 721 SWA"/>
               </a:rPr>
-              <a:t>Push Local </a:t>
+              <a:t>Pull </a:t>
             </a:r>
             <a:r>
               <a:rPr lang="en-US" dirty="0" err="1">
@@ -5624,13 +5624,61 @@
                 </a:solidFill>
                 <a:latin typeface="Swiss 721 SWA"/>
               </a:rPr>
-              <a:t> to GitHub</a:t>
+              <a:t> from GitHub</a:t>
             </a:r>
           </a:p>
           <a:p>
             <a:pPr marL="800100" lvl="1" indent="-342900">
               <a:buFont typeface="+mj-lt"/>
+              <a:buAutoNum type="alphaLcParenR"/>
+            </a:pPr>
+            <a:r>
+              <a:rPr lang="en-US" dirty="0">
+                <a:solidFill>
+                  <a:srgbClr val="444444"/>
+                </a:solidFill>
+                <a:latin typeface="Swiss 721 SWA"/>
+              </a:rPr>
+              <a:t>Command : git pull origin master</a:t>
+            </a:r>
+          </a:p>
+          <a:p>
+            <a:pPr marL="342900" indent="-342900">
+              <a:buFont typeface="+mj-lt"/>
               <a:buAutoNum type="arabicPeriod"/>
+            </a:pPr>
+            <a:r>
+              <a:rPr lang="en-US" dirty="0">
+                <a:solidFill>
+                  <a:srgbClr val="444444"/>
+                </a:solidFill>
+                <a:latin typeface="Swiss 721 SWA"/>
+              </a:rPr>
+              <a:t>Push Local </a:t>
+            </a:r>
+            <a:r>
+              <a:rPr lang="en-US" dirty="0" err="1">
+                <a:solidFill>
+                  <a:srgbClr val="444444"/>
+                </a:solidFill>
+                <a:latin typeface="Swiss 721 SWA"/>
+              </a:rPr>
+              <a:t>Respository</a:t>
+            </a:r>
+            <a:r>
+              <a:rPr lang="en-US" dirty="0">
+                <a:solidFill>
+                  <a:srgbClr val="444444"/>
+                </a:solidFill>
+                <a:latin typeface="Swiss 721 SWA"/>
+              </a:rPr>
+              <a:t> to GitHub</a:t>
+            </a:r>
+          </a:p>
+          <a:p>
+            <a:pPr marL="800100" lvl="1" indent="-342900">
+              <a:buFont typeface="+mj-lt"/>
+              <a:buAutoNum type="alphaLcParenR"/>
             </a:pPr>
             <a:r>
               <a:rPr lang="en-US" dirty="0">

</xml_diff>

<commit_message>
made changes to github ppt
</commit_message>
<xml_diff>
--- a/GitHub/Github Tutorial for Beginners.pptx
+++ b/GitHub/Github Tutorial for Beginners.pptx
@@ -5389,7 +5389,7 @@
         <p:spPr>
           <a:xfrm>
             <a:off x="838199" y="1300163"/>
-            <a:ext cx="10187763" cy="4247317"/>
+            <a:ext cx="10187763" cy="5355312"/>
           </a:xfrm>
           <a:prstGeom prst="rect">
             <a:avLst/>
@@ -5702,8 +5702,80 @@
                 </a:solidFill>
                 <a:latin typeface="Swiss 721 SWA"/>
               </a:rPr>
-              <a:t>  </a:t>
-            </a:r>
+              <a:t>What branches are available in your working directory ? </a:t>
+            </a:r>
+          </a:p>
+          <a:p>
+            <a:pPr marL="800100" lvl="1" indent="-342900">
+              <a:buFont typeface="+mj-lt"/>
+              <a:buAutoNum type="alphaLcParenR"/>
+            </a:pPr>
+            <a:r>
+              <a:rPr lang="en-US" dirty="0">
+                <a:solidFill>
+                  <a:srgbClr val="444444"/>
+                </a:solidFill>
+                <a:latin typeface="Swiss 721 SWA"/>
+              </a:rPr>
+              <a:t>Command : git branch  </a:t>
+            </a:r>
+          </a:p>
+          <a:p>
+            <a:pPr marL="342900" indent="-342900">
+              <a:buFont typeface="+mj-lt"/>
+              <a:buAutoNum type="arabicPeriod"/>
+            </a:pPr>
+            <a:r>
+              <a:rPr lang="en-US" dirty="0">
+                <a:solidFill>
+                  <a:srgbClr val="444444"/>
+                </a:solidFill>
+                <a:latin typeface="Swiss 721 SWA"/>
+              </a:rPr>
+              <a:t>Want to see what files have changed? Git status will show you a report.</a:t>
+            </a:r>
+          </a:p>
+          <a:p>
+            <a:pPr marL="800100" lvl="1" indent="-342900">
+              <a:buFont typeface="+mj-lt"/>
+              <a:buAutoNum type="alphaLcParenR"/>
+            </a:pPr>
+            <a:r>
+              <a:rPr lang="en-US" dirty="0">
+                <a:solidFill>
+                  <a:srgbClr val="444444"/>
+                </a:solidFill>
+                <a:latin typeface="Swiss 721 SWA"/>
+              </a:rPr>
+              <a:t>Command : </a:t>
+            </a:r>
+            <a:r>
+              <a:rPr lang="en-US">
+                <a:solidFill>
+                  <a:srgbClr val="444444"/>
+                </a:solidFill>
+                <a:latin typeface="Swiss 721 SWA"/>
+              </a:rPr>
+              <a:t>git status -a</a:t>
+            </a:r>
+            <a:endParaRPr lang="en-US" dirty="0">
+              <a:solidFill>
+                <a:srgbClr val="444444"/>
+              </a:solidFill>
+              <a:latin typeface="Swiss 721 SWA"/>
+            </a:endParaRPr>
+          </a:p>
+          <a:p>
+            <a:pPr marL="342900" indent="-342900">
+              <a:buFont typeface="+mj-lt"/>
+              <a:buAutoNum type="arabicPeriod"/>
+            </a:pPr>
+            <a:endParaRPr lang="en-US" dirty="0">
+              <a:solidFill>
+                <a:srgbClr val="444444"/>
+              </a:solidFill>
+              <a:latin typeface="Swiss 721 SWA"/>
+            </a:endParaRPr>
           </a:p>
           <a:p>
             <a:pPr marL="342900" indent="-342900">

</xml_diff>

<commit_message>
made changes to git commands
</commit_message>
<xml_diff>
--- a/GitHub/Github Tutorial for Beginners.pptx
+++ b/GitHub/Github Tutorial for Beginners.pptx
@@ -5389,7 +5389,7 @@
         <p:spPr>
           <a:xfrm>
             <a:off x="838199" y="1300163"/>
-            <a:ext cx="10187763" cy="4247317"/>
+            <a:ext cx="10187763" cy="6186309"/>
           </a:xfrm>
           <a:prstGeom prst="rect">
             <a:avLst/>
@@ -5702,7 +5702,127 @@
                 </a:solidFill>
                 <a:latin typeface="Swiss 721 SWA"/>
               </a:rPr>
-              <a:t>  </a:t>
+              <a:t>What branches are available in your working directory ? </a:t>
+            </a:r>
+          </a:p>
+          <a:p>
+            <a:pPr marL="800100" lvl="1" indent="-342900">
+              <a:buFont typeface="+mj-lt"/>
+              <a:buAutoNum type="alphaLcParenR"/>
+            </a:pPr>
+            <a:r>
+              <a:rPr lang="en-US" dirty="0">
+                <a:solidFill>
+                  <a:srgbClr val="444444"/>
+                </a:solidFill>
+                <a:latin typeface="Swiss 721 SWA"/>
+              </a:rPr>
+              <a:t>Command : git branch  </a:t>
+            </a:r>
+          </a:p>
+          <a:p>
+            <a:pPr marL="342900" indent="-342900">
+              <a:buFont typeface="+mj-lt"/>
+              <a:buAutoNum type="arabicPeriod"/>
+            </a:pPr>
+            <a:r>
+              <a:rPr lang="en-US" dirty="0">
+                <a:solidFill>
+                  <a:srgbClr val="444444"/>
+                </a:solidFill>
+                <a:latin typeface="Swiss 721 SWA"/>
+              </a:rPr>
+              <a:t>Want to see what files have changed? Git status will show you a report.</a:t>
+            </a:r>
+          </a:p>
+          <a:p>
+            <a:pPr marL="800100" lvl="1" indent="-342900">
+              <a:buFont typeface="+mj-lt"/>
+              <a:buAutoNum type="alphaLcParenR"/>
+            </a:pPr>
+            <a:r>
+              <a:rPr lang="en-US" dirty="0">
+                <a:solidFill>
+                  <a:srgbClr val="444444"/>
+                </a:solidFill>
+                <a:latin typeface="Swiss 721 SWA"/>
+              </a:rPr>
+              <a:t>Command : git status -a</a:t>
+            </a:r>
+          </a:p>
+          <a:p>
+            <a:pPr marL="342900" indent="-342900">
+              <a:buFont typeface="+mj-lt"/>
+              <a:buAutoNum type="arabicPeriod"/>
+            </a:pPr>
+            <a:r>
+              <a:rPr lang="en-US" dirty="0">
+                <a:solidFill>
+                  <a:srgbClr val="444444"/>
+                </a:solidFill>
+                <a:latin typeface="Swiss 721 SWA"/>
+              </a:rPr>
+              <a:t>Switch to another branch</a:t>
+            </a:r>
+          </a:p>
+          <a:p>
+            <a:pPr marL="342900" indent="-342900">
+              <a:buFont typeface="+mj-lt"/>
+              <a:buAutoNum type="arabicPeriod"/>
+            </a:pPr>
+            <a:r>
+              <a:rPr lang="en-US" dirty="0">
+                <a:solidFill>
+                  <a:srgbClr val="444444"/>
+                </a:solidFill>
+                <a:latin typeface="Swiss 721 SWA"/>
+              </a:rPr>
+              <a:t>Command : git checkout &lt;branch-name&gt;</a:t>
+            </a:r>
+          </a:p>
+          <a:p>
+            <a:pPr marL="342900" indent="-342900">
+              <a:buFont typeface="+mj-lt"/>
+              <a:buAutoNum type="arabicPeriod"/>
+            </a:pPr>
+            <a:r>
+              <a:rPr lang="en-US" dirty="0">
+                <a:solidFill>
+                  <a:srgbClr val="444444"/>
+                </a:solidFill>
+                <a:latin typeface="Swiss 721 SWA"/>
+              </a:rPr>
+              <a:t>Merge a branch into </a:t>
+            </a:r>
+            <a:r>
+              <a:rPr lang="en-US">
+                <a:solidFill>
+                  <a:srgbClr val="444444"/>
+                </a:solidFill>
+                <a:latin typeface="Swiss 721 SWA"/>
+              </a:rPr>
+              <a:t>current branch. </a:t>
+            </a:r>
+            <a:endParaRPr lang="en-US" dirty="0">
+              <a:solidFill>
+                <a:srgbClr val="444444"/>
+              </a:solidFill>
+              <a:latin typeface="Swiss 721 SWA"/>
+            </a:endParaRPr>
+          </a:p>
+          <a:p>
+            <a:pPr marL="342900" indent="-342900">
+              <a:buFont typeface="+mj-lt"/>
+              <a:buAutoNum type="arabicPeriod"/>
+            </a:pPr>
+            <a:r>
+              <a:rPr lang="en-US" dirty="0">
+                <a:solidFill>
+                  <a:srgbClr val="444444"/>
+                </a:solidFill>
+                <a:latin typeface="Swiss 721 SWA"/>
+              </a:rPr>
+              <a:t>Command : git merge &lt;Branch Name&gt; </a:t>
             </a:r>
           </a:p>
           <a:p>

</xml_diff>

<commit_message>
added git commands to Github ppt
</commit_message>
<xml_diff>
--- a/GitHub/Github Tutorial for Beginners.pptx
+++ b/GitHub/Github Tutorial for Beginners.pptx
@@ -5365,7 +5365,7 @@
           <a:p>
             <a:r>
               <a:rPr lang="en-US" b="1" dirty="0"/>
-              <a:t>Commands in Mac</a:t>
+              <a:t>Git Commands</a:t>
             </a:r>
             <a:br>
               <a:rPr lang="en-US" b="1" dirty="0"/>
@@ -5766,9 +5766,9 @@
             </a:r>
           </a:p>
           <a:p>
-            <a:pPr marL="342900" indent="-342900">
+            <a:pPr marL="800100" lvl="1" indent="-342900">
               <a:buFont typeface="+mj-lt"/>
-              <a:buAutoNum type="arabicPeriod"/>
+              <a:buAutoNum type="alphaLcParenR"/>
             </a:pPr>
             <a:r>
               <a:rPr lang="en-US" dirty="0">
@@ -5792,28 +5792,13 @@
                 </a:solidFill>
                 <a:latin typeface="Swiss 721 SWA"/>
               </a:rPr>
-              <a:t>Merge a branch into </a:t>
-            </a:r>
-            <a:r>
-              <a:rPr lang="en-US">
-                <a:solidFill>
-                  <a:srgbClr val="444444"/>
-                </a:solidFill>
-                <a:latin typeface="Swiss 721 SWA"/>
-              </a:rPr>
-              <a:t>current branch. </a:t>
-            </a:r>
-            <a:endParaRPr lang="en-US" dirty="0">
-              <a:solidFill>
-                <a:srgbClr val="444444"/>
-              </a:solidFill>
-              <a:latin typeface="Swiss 721 SWA"/>
-            </a:endParaRPr>
-          </a:p>
-          <a:p>
-            <a:pPr marL="342900" indent="-342900">
+              <a:t>Merge a branch into current branch</a:t>
+            </a:r>
+          </a:p>
+          <a:p>
+            <a:pPr marL="800100" lvl="1" indent="-342900">
               <a:buFont typeface="+mj-lt"/>
-              <a:buAutoNum type="arabicPeriod"/>
+              <a:buAutoNum type="alphaLcParenR"/>
             </a:pPr>
             <a:r>
               <a:rPr lang="en-US" dirty="0">

</xml_diff>

<commit_message>
added gitignore to the presentation
</commit_message>
<xml_diff>
--- a/GitHub/Github Tutorial for Beginners.pptx
+++ b/GitHub/Github Tutorial for Beginners.pptx
@@ -202,7 +202,7 @@
           <a:p>
             <a:fld id="{69349387-990C-47ED-9AD6-AB48EBEDE7E2}" type="datetimeFigureOut">
               <a:rPr lang="en-US" smtClean="0"/>
-              <a:t>7/26/20</a:t>
+              <a:t>7/27/20</a:t>
             </a:fld>
             <a:endParaRPr lang="en-US"/>
           </a:p>
@@ -784,7 +784,7 @@
           <a:p>
             <a:fld id="{D293FDA7-2A39-4CAD-8199-039D133783F5}" type="datetimeFigureOut">
               <a:rPr lang="en-US" smtClean="0"/>
-              <a:t>7/26/20</a:t>
+              <a:t>7/27/20</a:t>
             </a:fld>
             <a:endParaRPr lang="en-US"/>
           </a:p>
@@ -982,7 +982,7 @@
           <a:p>
             <a:fld id="{D293FDA7-2A39-4CAD-8199-039D133783F5}" type="datetimeFigureOut">
               <a:rPr lang="en-US" smtClean="0"/>
-              <a:t>7/26/20</a:t>
+              <a:t>7/27/20</a:t>
             </a:fld>
             <a:endParaRPr lang="en-US"/>
           </a:p>
@@ -1190,7 +1190,7 @@
           <a:p>
             <a:fld id="{D293FDA7-2A39-4CAD-8199-039D133783F5}" type="datetimeFigureOut">
               <a:rPr lang="en-US" smtClean="0"/>
-              <a:t>7/26/20</a:t>
+              <a:t>7/27/20</a:t>
             </a:fld>
             <a:endParaRPr lang="en-US"/>
           </a:p>
@@ -1388,7 +1388,7 @@
           <a:p>
             <a:fld id="{D293FDA7-2A39-4CAD-8199-039D133783F5}" type="datetimeFigureOut">
               <a:rPr lang="en-US" smtClean="0"/>
-              <a:t>7/26/20</a:t>
+              <a:t>7/27/20</a:t>
             </a:fld>
             <a:endParaRPr lang="en-US"/>
           </a:p>
@@ -1663,7 +1663,7 @@
           <a:p>
             <a:fld id="{D293FDA7-2A39-4CAD-8199-039D133783F5}" type="datetimeFigureOut">
               <a:rPr lang="en-US" smtClean="0"/>
-              <a:t>7/26/20</a:t>
+              <a:t>7/27/20</a:t>
             </a:fld>
             <a:endParaRPr lang="en-US"/>
           </a:p>
@@ -1928,7 +1928,7 @@
           <a:p>
             <a:fld id="{D293FDA7-2A39-4CAD-8199-039D133783F5}" type="datetimeFigureOut">
               <a:rPr lang="en-US" smtClean="0"/>
-              <a:t>7/26/20</a:t>
+              <a:t>7/27/20</a:t>
             </a:fld>
             <a:endParaRPr lang="en-US"/>
           </a:p>
@@ -2340,7 +2340,7 @@
           <a:p>
             <a:fld id="{D293FDA7-2A39-4CAD-8199-039D133783F5}" type="datetimeFigureOut">
               <a:rPr lang="en-US" smtClean="0"/>
-              <a:t>7/26/20</a:t>
+              <a:t>7/27/20</a:t>
             </a:fld>
             <a:endParaRPr lang="en-US"/>
           </a:p>
@@ -2481,7 +2481,7 @@
           <a:p>
             <a:fld id="{D293FDA7-2A39-4CAD-8199-039D133783F5}" type="datetimeFigureOut">
               <a:rPr lang="en-US" smtClean="0"/>
-              <a:t>7/26/20</a:t>
+              <a:t>7/27/20</a:t>
             </a:fld>
             <a:endParaRPr lang="en-US"/>
           </a:p>
@@ -2594,7 +2594,7 @@
           <a:p>
             <a:fld id="{D293FDA7-2A39-4CAD-8199-039D133783F5}" type="datetimeFigureOut">
               <a:rPr lang="en-US" smtClean="0"/>
-              <a:t>7/26/20</a:t>
+              <a:t>7/27/20</a:t>
             </a:fld>
             <a:endParaRPr lang="en-US"/>
           </a:p>
@@ -2905,7 +2905,7 @@
           <a:p>
             <a:fld id="{D293FDA7-2A39-4CAD-8199-039D133783F5}" type="datetimeFigureOut">
               <a:rPr lang="en-US" smtClean="0"/>
-              <a:t>7/26/20</a:t>
+              <a:t>7/27/20</a:t>
             </a:fld>
             <a:endParaRPr lang="en-US"/>
           </a:p>
@@ -3193,7 +3193,7 @@
           <a:p>
             <a:fld id="{D293FDA7-2A39-4CAD-8199-039D133783F5}" type="datetimeFigureOut">
               <a:rPr lang="en-US" smtClean="0"/>
-              <a:t>7/26/20</a:t>
+              <a:t>7/27/20</a:t>
             </a:fld>
             <a:endParaRPr lang="en-US"/>
           </a:p>
@@ -3434,7 +3434,7 @@
           <a:p>
             <a:fld id="{D293FDA7-2A39-4CAD-8199-039D133783F5}" type="datetimeFigureOut">
               <a:rPr lang="en-US" smtClean="0"/>
-              <a:t>7/26/20</a:t>
+              <a:t>7/27/20</a:t>
             </a:fld>
             <a:endParaRPr lang="en-US"/>
           </a:p>
@@ -5116,7 +5116,7 @@
         <p:spPr>
           <a:xfrm>
             <a:off x="838199" y="1300163"/>
-            <a:ext cx="10187763" cy="3416320"/>
+            <a:ext cx="10187763" cy="3970318"/>
           </a:xfrm>
           <a:prstGeom prst="rect">
             <a:avLst/>
@@ -5300,6 +5300,28 @@
               <a:rPr lang="en-US" b="1" dirty="0"/>
               <a:t>Step 5: Connect your GitHub repo with your computer</a:t>
             </a:r>
+          </a:p>
+          <a:p>
+            <a:endParaRPr lang="en-US" b="1" dirty="0"/>
+          </a:p>
+          <a:p>
+            <a:r>
+              <a:rPr lang="en-US" b="1" dirty="0"/>
+              <a:t>Optional: create .</a:t>
+            </a:r>
+            <a:r>
+              <a:rPr lang="en-US" b="1" dirty="0" err="1"/>
+              <a:t>gitignore</a:t>
+            </a:r>
+            <a:r>
+              <a:rPr lang="en-US" b="1" dirty="0"/>
+              <a:t> file </a:t>
+            </a:r>
+            <a:r>
+              <a:rPr lang="en-US" dirty="0"/>
+              <a:t>to tell Git which files and directories to ignore when you make a commit</a:t>
+            </a:r>
+            <a:endParaRPr lang="en-US" b="1" dirty="0"/>
           </a:p>
           <a:p>
             <a:endParaRPr lang="en-US" b="0" i="0" dirty="0">

</xml_diff>

<commit_message>
added git clean command to the ppt
</commit_message>
<xml_diff>
--- a/GitHub/Github Tutorial for Beginners.pptx
+++ b/GitHub/Github Tutorial for Beginners.pptx
@@ -202,7 +202,7 @@
           <a:p>
             <a:fld id="{69349387-990C-47ED-9AD6-AB48EBEDE7E2}" type="datetimeFigureOut">
               <a:rPr lang="en-US" smtClean="0"/>
-              <a:t>7/26/20</a:t>
+              <a:t>7/27/20</a:t>
             </a:fld>
             <a:endParaRPr lang="en-US"/>
           </a:p>
@@ -784,7 +784,7 @@
           <a:p>
             <a:fld id="{D293FDA7-2A39-4CAD-8199-039D133783F5}" type="datetimeFigureOut">
               <a:rPr lang="en-US" smtClean="0"/>
-              <a:t>7/26/20</a:t>
+              <a:t>7/27/20</a:t>
             </a:fld>
             <a:endParaRPr lang="en-US"/>
           </a:p>
@@ -982,7 +982,7 @@
           <a:p>
             <a:fld id="{D293FDA7-2A39-4CAD-8199-039D133783F5}" type="datetimeFigureOut">
               <a:rPr lang="en-US" smtClean="0"/>
-              <a:t>7/26/20</a:t>
+              <a:t>7/27/20</a:t>
             </a:fld>
             <a:endParaRPr lang="en-US"/>
           </a:p>
@@ -1190,7 +1190,7 @@
           <a:p>
             <a:fld id="{D293FDA7-2A39-4CAD-8199-039D133783F5}" type="datetimeFigureOut">
               <a:rPr lang="en-US" smtClean="0"/>
-              <a:t>7/26/20</a:t>
+              <a:t>7/27/20</a:t>
             </a:fld>
             <a:endParaRPr lang="en-US"/>
           </a:p>
@@ -1388,7 +1388,7 @@
           <a:p>
             <a:fld id="{D293FDA7-2A39-4CAD-8199-039D133783F5}" type="datetimeFigureOut">
               <a:rPr lang="en-US" smtClean="0"/>
-              <a:t>7/26/20</a:t>
+              <a:t>7/27/20</a:t>
             </a:fld>
             <a:endParaRPr lang="en-US"/>
           </a:p>
@@ -1663,7 +1663,7 @@
           <a:p>
             <a:fld id="{D293FDA7-2A39-4CAD-8199-039D133783F5}" type="datetimeFigureOut">
               <a:rPr lang="en-US" smtClean="0"/>
-              <a:t>7/26/20</a:t>
+              <a:t>7/27/20</a:t>
             </a:fld>
             <a:endParaRPr lang="en-US"/>
           </a:p>
@@ -1928,7 +1928,7 @@
           <a:p>
             <a:fld id="{D293FDA7-2A39-4CAD-8199-039D133783F5}" type="datetimeFigureOut">
               <a:rPr lang="en-US" smtClean="0"/>
-              <a:t>7/26/20</a:t>
+              <a:t>7/27/20</a:t>
             </a:fld>
             <a:endParaRPr lang="en-US"/>
           </a:p>
@@ -2340,7 +2340,7 @@
           <a:p>
             <a:fld id="{D293FDA7-2A39-4CAD-8199-039D133783F5}" type="datetimeFigureOut">
               <a:rPr lang="en-US" smtClean="0"/>
-              <a:t>7/26/20</a:t>
+              <a:t>7/27/20</a:t>
             </a:fld>
             <a:endParaRPr lang="en-US"/>
           </a:p>
@@ -2481,7 +2481,7 @@
           <a:p>
             <a:fld id="{D293FDA7-2A39-4CAD-8199-039D133783F5}" type="datetimeFigureOut">
               <a:rPr lang="en-US" smtClean="0"/>
-              <a:t>7/26/20</a:t>
+              <a:t>7/27/20</a:t>
             </a:fld>
             <a:endParaRPr lang="en-US"/>
           </a:p>
@@ -2594,7 +2594,7 @@
           <a:p>
             <a:fld id="{D293FDA7-2A39-4CAD-8199-039D133783F5}" type="datetimeFigureOut">
               <a:rPr lang="en-US" smtClean="0"/>
-              <a:t>7/26/20</a:t>
+              <a:t>7/27/20</a:t>
             </a:fld>
             <a:endParaRPr lang="en-US"/>
           </a:p>
@@ -2905,7 +2905,7 @@
           <a:p>
             <a:fld id="{D293FDA7-2A39-4CAD-8199-039D133783F5}" type="datetimeFigureOut">
               <a:rPr lang="en-US" smtClean="0"/>
-              <a:t>7/26/20</a:t>
+              <a:t>7/27/20</a:t>
             </a:fld>
             <a:endParaRPr lang="en-US"/>
           </a:p>
@@ -3193,7 +3193,7 @@
           <a:p>
             <a:fld id="{D293FDA7-2A39-4CAD-8199-039D133783F5}" type="datetimeFigureOut">
               <a:rPr lang="en-US" smtClean="0"/>
-              <a:t>7/26/20</a:t>
+              <a:t>7/27/20</a:t>
             </a:fld>
             <a:endParaRPr lang="en-US"/>
           </a:p>
@@ -3434,7 +3434,7 @@
           <a:p>
             <a:fld id="{D293FDA7-2A39-4CAD-8199-039D133783F5}" type="datetimeFigureOut">
               <a:rPr lang="en-US" smtClean="0"/>
-              <a:t>7/26/20</a:t>
+              <a:t>7/27/20</a:t>
             </a:fld>
             <a:endParaRPr lang="en-US"/>
           </a:p>
@@ -5389,7 +5389,7 @@
         <p:spPr>
           <a:xfrm>
             <a:off x="838199" y="1300163"/>
-            <a:ext cx="10187763" cy="6186309"/>
+            <a:ext cx="9716815" cy="5262979"/>
           </a:xfrm>
           <a:prstGeom prst="rect">
             <a:avLst/>
@@ -5406,7 +5406,7 @@
               <a:buAutoNum type="arabicPeriod"/>
             </a:pPr>
             <a:r>
-              <a:rPr lang="en-US" b="0" i="0" dirty="0">
+              <a:rPr lang="en-US" sz="1400" b="0" i="0" dirty="0">
                 <a:solidFill>
                   <a:srgbClr val="444444"/>
                 </a:solidFill>
@@ -5422,7 +5422,7 @@
               <a:buAutoNum type="alphaLcParenR"/>
             </a:pPr>
             <a:r>
-              <a:rPr lang="en-US" dirty="0">
+              <a:rPr lang="en-US" sz="1400" dirty="0">
                 <a:solidFill>
                   <a:srgbClr val="444444"/>
                 </a:solidFill>
@@ -5430,7 +5430,7 @@
               </a:rPr>
               <a:t>Command : CD &lt;Directory Name&gt;</a:t>
             </a:r>
-            <a:endParaRPr lang="en-US" b="0" i="0" dirty="0">
+            <a:endParaRPr lang="en-US" sz="1400" b="0" i="0" dirty="0">
               <a:solidFill>
                 <a:srgbClr val="444444"/>
               </a:solidFill>
@@ -5444,7 +5444,7 @@
               <a:buAutoNum type="arabicPeriod"/>
             </a:pPr>
             <a:r>
-              <a:rPr lang="en-US" dirty="0">
+              <a:rPr lang="en-US" sz="1400" dirty="0">
                 <a:solidFill>
                   <a:srgbClr val="444444"/>
                 </a:solidFill>
@@ -5459,7 +5459,7 @@
               <a:buAutoNum type="alphaLcParenR"/>
             </a:pPr>
             <a:r>
-              <a:rPr lang="en-US" dirty="0">
+              <a:rPr lang="en-US" sz="1400" dirty="0">
                 <a:solidFill>
                   <a:srgbClr val="444444"/>
                 </a:solidFill>
@@ -5468,7 +5468,7 @@
               <a:t>Command : git </a:t>
             </a:r>
             <a:r>
-              <a:rPr lang="en-US" dirty="0" err="1">
+              <a:rPr lang="en-US" sz="1400" dirty="0" err="1">
                 <a:solidFill>
                   <a:srgbClr val="444444"/>
                 </a:solidFill>
@@ -5476,7 +5476,7 @@
               </a:rPr>
               <a:t>init</a:t>
             </a:r>
-            <a:endParaRPr lang="en-US" dirty="0">
+            <a:endParaRPr lang="en-US" sz="1400" dirty="0">
               <a:solidFill>
                 <a:srgbClr val="444444"/>
               </a:solidFill>
@@ -5489,7 +5489,7 @@
               <a:buAutoNum type="arabicPeriod"/>
             </a:pPr>
             <a:r>
-              <a:rPr lang="en-US" dirty="0">
+              <a:rPr lang="en-US" sz="1400" dirty="0">
                 <a:solidFill>
                   <a:srgbClr val="444444"/>
                 </a:solidFill>
@@ -5504,7 +5504,7 @@
               <a:buAutoNum type="alphaLcParenR"/>
             </a:pPr>
             <a:r>
-              <a:rPr lang="en-US" dirty="0">
+              <a:rPr lang="en-US" sz="1400" dirty="0">
                 <a:solidFill>
                   <a:srgbClr val="444444"/>
                 </a:solidFill>
@@ -5519,7 +5519,7 @@
               <a:buAutoNum type="arabicPeriod"/>
             </a:pPr>
             <a:r>
-              <a:rPr lang="en-US" dirty="0">
+              <a:rPr lang="en-US" sz="1400" dirty="0">
                 <a:solidFill>
                   <a:srgbClr val="444444"/>
                 </a:solidFill>
@@ -5534,7 +5534,7 @@
               <a:buAutoNum type="alphaLcParenR"/>
             </a:pPr>
             <a:r>
-              <a:rPr lang="en-US" dirty="0">
+              <a:rPr lang="en-US" sz="1400" dirty="0">
                 <a:solidFill>
                   <a:srgbClr val="444444"/>
                 </a:solidFill>
@@ -5543,7 +5543,7 @@
               <a:t>Command : git remote add origin https://</a:t>
             </a:r>
             <a:r>
-              <a:rPr lang="en-US" dirty="0" err="1">
+              <a:rPr lang="en-US" sz="1400" dirty="0" err="1">
                 <a:solidFill>
                   <a:srgbClr val="444444"/>
                 </a:solidFill>
@@ -5552,7 +5552,7 @@
               <a:t>github.com</a:t>
             </a:r>
             <a:r>
-              <a:rPr lang="en-US" dirty="0">
+              <a:rPr lang="en-US" sz="1400" dirty="0">
                 <a:solidFill>
                   <a:srgbClr val="444444"/>
                 </a:solidFill>
@@ -5561,7 +5561,7 @@
               <a:t>/</a:t>
             </a:r>
             <a:r>
-              <a:rPr lang="en-US" dirty="0" err="1">
+              <a:rPr lang="en-US" sz="1400" dirty="0" err="1">
                 <a:solidFill>
                   <a:srgbClr val="444444"/>
                 </a:solidFill>
@@ -5570,7 +5570,7 @@
               <a:t>mopenn</a:t>
             </a:r>
             <a:r>
-              <a:rPr lang="en-US" dirty="0">
+              <a:rPr lang="en-US" sz="1400" dirty="0">
                 <a:solidFill>
                   <a:srgbClr val="444444"/>
                 </a:solidFill>
@@ -5579,7 +5579,7 @@
               <a:t>/</a:t>
             </a:r>
             <a:r>
-              <a:rPr lang="en-US" dirty="0" err="1">
+              <a:rPr lang="en-US" sz="1400" dirty="0" err="1">
                 <a:solidFill>
                   <a:srgbClr val="444444"/>
                 </a:solidFill>
@@ -5587,7 +5587,7 @@
               </a:rPr>
               <a:t>opensource.git</a:t>
             </a:r>
-            <a:endParaRPr lang="en-US" dirty="0">
+            <a:endParaRPr lang="en-US" sz="1400" dirty="0">
               <a:solidFill>
                 <a:srgbClr val="444444"/>
               </a:solidFill>
@@ -5600,7 +5600,7 @@
               <a:buAutoNum type="arabicPeriod"/>
             </a:pPr>
             <a:r>
-              <a:rPr lang="en-US" dirty="0">
+              <a:rPr lang="en-US" sz="1400" dirty="0">
                 <a:solidFill>
                   <a:srgbClr val="444444"/>
                 </a:solidFill>
@@ -5609,7 +5609,7 @@
               <a:t>Pull </a:t>
             </a:r>
             <a:r>
-              <a:rPr lang="en-US" dirty="0" err="1">
+              <a:rPr lang="en-US" sz="1400" dirty="0" err="1">
                 <a:solidFill>
                   <a:srgbClr val="444444"/>
                 </a:solidFill>
@@ -5618,7 +5618,7 @@
               <a:t>Respository</a:t>
             </a:r>
             <a:r>
-              <a:rPr lang="en-US" dirty="0">
+              <a:rPr lang="en-US" sz="1400" dirty="0">
                 <a:solidFill>
                   <a:srgbClr val="444444"/>
                 </a:solidFill>
@@ -5633,7 +5633,7 @@
               <a:buAutoNum type="alphaLcParenR"/>
             </a:pPr>
             <a:r>
-              <a:rPr lang="en-US" dirty="0">
+              <a:rPr lang="en-US" sz="1400" dirty="0">
                 <a:solidFill>
                   <a:srgbClr val="444444"/>
                 </a:solidFill>
@@ -5648,7 +5648,7 @@
               <a:buAutoNum type="arabicPeriod"/>
             </a:pPr>
             <a:r>
-              <a:rPr lang="en-US" dirty="0">
+              <a:rPr lang="en-US" sz="1400" dirty="0">
                 <a:solidFill>
                   <a:srgbClr val="444444"/>
                 </a:solidFill>
@@ -5657,7 +5657,7 @@
               <a:t>Push Local </a:t>
             </a:r>
             <a:r>
-              <a:rPr lang="en-US" dirty="0" err="1">
+              <a:rPr lang="en-US" sz="1400" dirty="0" err="1">
                 <a:solidFill>
                   <a:srgbClr val="444444"/>
                 </a:solidFill>
@@ -5666,7 +5666,7 @@
               <a:t>Respository</a:t>
             </a:r>
             <a:r>
-              <a:rPr lang="en-US" dirty="0">
+              <a:rPr lang="en-US" sz="1400" dirty="0">
                 <a:solidFill>
                   <a:srgbClr val="444444"/>
                 </a:solidFill>
@@ -5681,7 +5681,7 @@
               <a:buAutoNum type="alphaLcParenR"/>
             </a:pPr>
             <a:r>
-              <a:rPr lang="en-US" dirty="0">
+              <a:rPr lang="en-US" sz="1400" dirty="0">
                 <a:solidFill>
                   <a:srgbClr val="444444"/>
                 </a:solidFill>
@@ -5696,7 +5696,7 @@
               <a:buAutoNum type="arabicPeriod"/>
             </a:pPr>
             <a:r>
-              <a:rPr lang="en-US" dirty="0">
+              <a:rPr lang="en-US" sz="1400" dirty="0">
                 <a:solidFill>
                   <a:srgbClr val="444444"/>
                 </a:solidFill>
@@ -5711,7 +5711,7 @@
               <a:buAutoNum type="alphaLcParenR"/>
             </a:pPr>
             <a:r>
-              <a:rPr lang="en-US" dirty="0">
+              <a:rPr lang="en-US" sz="1400" dirty="0">
                 <a:solidFill>
                   <a:srgbClr val="444444"/>
                 </a:solidFill>
@@ -5726,7 +5726,7 @@
               <a:buAutoNum type="arabicPeriod"/>
             </a:pPr>
             <a:r>
-              <a:rPr lang="en-US" dirty="0">
+              <a:rPr lang="en-US" sz="1400" dirty="0">
                 <a:solidFill>
                   <a:srgbClr val="444444"/>
                 </a:solidFill>
@@ -5741,7 +5741,7 @@
               <a:buAutoNum type="alphaLcParenR"/>
             </a:pPr>
             <a:r>
-              <a:rPr lang="en-US" dirty="0">
+              <a:rPr lang="en-US" sz="1400" dirty="0">
                 <a:solidFill>
                   <a:srgbClr val="444444"/>
                 </a:solidFill>
@@ -5756,7 +5756,7 @@
               <a:buAutoNum type="arabicPeriod"/>
             </a:pPr>
             <a:r>
-              <a:rPr lang="en-US" dirty="0">
+              <a:rPr lang="en-US" sz="1400" dirty="0">
                 <a:solidFill>
                   <a:srgbClr val="444444"/>
                 </a:solidFill>
@@ -5771,7 +5771,7 @@
               <a:buAutoNum type="alphaLcParenR"/>
             </a:pPr>
             <a:r>
-              <a:rPr lang="en-US" dirty="0">
+              <a:rPr lang="en-US" sz="1400" dirty="0">
                 <a:solidFill>
                   <a:srgbClr val="444444"/>
                 </a:solidFill>
@@ -5786,7 +5786,7 @@
               <a:buAutoNum type="arabicPeriod"/>
             </a:pPr>
             <a:r>
-              <a:rPr lang="en-US" dirty="0">
+              <a:rPr lang="en-US" sz="1400" dirty="0">
                 <a:solidFill>
                   <a:srgbClr val="444444"/>
                 </a:solidFill>
@@ -5801,7 +5801,7 @@
               <a:buAutoNum type="alphaLcParenR"/>
             </a:pPr>
             <a:r>
-              <a:rPr lang="en-US" dirty="0">
+              <a:rPr lang="en-US" sz="1400" dirty="0">
                 <a:solidFill>
                   <a:srgbClr val="444444"/>
                 </a:solidFill>
@@ -5815,7 +5815,37 @@
               <a:buFont typeface="+mj-lt"/>
               <a:buAutoNum type="arabicPeriod"/>
             </a:pPr>
-            <a:endParaRPr lang="en-US" dirty="0">
+            <a:r>
+              <a:rPr lang="en-US" sz="1400" dirty="0">
+                <a:solidFill>
+                  <a:srgbClr val="444444"/>
+                </a:solidFill>
+                <a:latin typeface="Swiss 721 SWA"/>
+              </a:rPr>
+              <a:t>Cleaning up untracked files</a:t>
+            </a:r>
+          </a:p>
+          <a:p>
+            <a:pPr marL="800100" lvl="1" indent="-342900">
+              <a:buFont typeface="+mj-lt"/>
+              <a:buAutoNum type="alphaLcParenR"/>
+            </a:pPr>
+            <a:r>
+              <a:rPr lang="en-US" sz="1400" dirty="0">
+                <a:solidFill>
+                  <a:srgbClr val="444444"/>
+                </a:solidFill>
+                <a:latin typeface="Swiss 721 SWA"/>
+              </a:rPr>
+              <a:t>Command : git clean  -d  -f .</a:t>
+            </a:r>
+          </a:p>
+          <a:p>
+            <a:pPr marL="342900" indent="-342900">
+              <a:buFont typeface="+mj-lt"/>
+              <a:buAutoNum type="arabicPeriod"/>
+            </a:pPr>
+            <a:endParaRPr lang="en-US" sz="1400" dirty="0">
               <a:solidFill>
                 <a:srgbClr val="444444"/>
               </a:solidFill>
@@ -5823,7 +5853,7 @@
             </a:endParaRPr>
           </a:p>
           <a:p>
-            <a:endParaRPr lang="en-US" b="0" i="0" dirty="0">
+            <a:endParaRPr lang="en-US" sz="1400" b="0" i="0" dirty="0">
               <a:solidFill>
                 <a:srgbClr val="444444"/>
               </a:solidFill>

</xml_diff>